<commit_message>
Added new Activities and built more functionality onto the Python end
</commit_message>
<xml_diff>
--- a/Project Documets/Archecture Diagram.pptx
+++ b/Project Documets/Archecture Diagram.pptx
@@ -6,6 +6,7 @@
   </p:sldMasterIdLst>
   <p:sldIdLst>
     <p:sldId id="256" r:id="rId2"/>
+    <p:sldId id="257" r:id="rId3"/>
   </p:sldIdLst>
   <p:sldSz cx="12192000" cy="6858000"/>
   <p:notesSz cx="6858000" cy="9144000"/>
@@ -104,6 +105,11 @@
       </a:defRPr>
     </a:lvl9pPr>
   </p:defaultTextStyle>
+  <p:extLst>
+    <p:ext uri="{EFAFB233-063F-42B5-8137-9DF3F51BA10A}">
+      <p15:sldGuideLst xmlns:p15="http://schemas.microsoft.com/office/powerpoint/2012/main"/>
+    </p:ext>
+  </p:extLst>
 </p:presentation>
 </file>
 
@@ -256,7 +262,7 @@
           <a:p>
             <a:fld id="{B16F96D5-A50A-49F2-A6B4-50C10BB05220}" type="datetimeFigureOut">
               <a:rPr lang="en-IE" smtClean="0"/>
-              <a:t>09/02/2022</a:t>
+              <a:t>01/04/2022</a:t>
             </a:fld>
             <a:endParaRPr lang="en-IE"/>
           </a:p>
@@ -456,7 +462,7 @@
           <a:p>
             <a:fld id="{B16F96D5-A50A-49F2-A6B4-50C10BB05220}" type="datetimeFigureOut">
               <a:rPr lang="en-IE" smtClean="0"/>
-              <a:t>09/02/2022</a:t>
+              <a:t>01/04/2022</a:t>
             </a:fld>
             <a:endParaRPr lang="en-IE"/>
           </a:p>
@@ -666,7 +672,7 @@
           <a:p>
             <a:fld id="{B16F96D5-A50A-49F2-A6B4-50C10BB05220}" type="datetimeFigureOut">
               <a:rPr lang="en-IE" smtClean="0"/>
-              <a:t>09/02/2022</a:t>
+              <a:t>01/04/2022</a:t>
             </a:fld>
             <a:endParaRPr lang="en-IE"/>
           </a:p>
@@ -866,7 +872,7 @@
           <a:p>
             <a:fld id="{B16F96D5-A50A-49F2-A6B4-50C10BB05220}" type="datetimeFigureOut">
               <a:rPr lang="en-IE" smtClean="0"/>
-              <a:t>09/02/2022</a:t>
+              <a:t>01/04/2022</a:t>
             </a:fld>
             <a:endParaRPr lang="en-IE"/>
           </a:p>
@@ -1142,7 +1148,7 @@
           <a:p>
             <a:fld id="{B16F96D5-A50A-49F2-A6B4-50C10BB05220}" type="datetimeFigureOut">
               <a:rPr lang="en-IE" smtClean="0"/>
-              <a:t>09/02/2022</a:t>
+              <a:t>01/04/2022</a:t>
             </a:fld>
             <a:endParaRPr lang="en-IE"/>
           </a:p>
@@ -1410,7 +1416,7 @@
           <a:p>
             <a:fld id="{B16F96D5-A50A-49F2-A6B4-50C10BB05220}" type="datetimeFigureOut">
               <a:rPr lang="en-IE" smtClean="0"/>
-              <a:t>09/02/2022</a:t>
+              <a:t>01/04/2022</a:t>
             </a:fld>
             <a:endParaRPr lang="en-IE"/>
           </a:p>
@@ -1825,7 +1831,7 @@
           <a:p>
             <a:fld id="{B16F96D5-A50A-49F2-A6B4-50C10BB05220}" type="datetimeFigureOut">
               <a:rPr lang="en-IE" smtClean="0"/>
-              <a:t>09/02/2022</a:t>
+              <a:t>01/04/2022</a:t>
             </a:fld>
             <a:endParaRPr lang="en-IE"/>
           </a:p>
@@ -1967,7 +1973,7 @@
           <a:p>
             <a:fld id="{B16F96D5-A50A-49F2-A6B4-50C10BB05220}" type="datetimeFigureOut">
               <a:rPr lang="en-IE" smtClean="0"/>
-              <a:t>09/02/2022</a:t>
+              <a:t>01/04/2022</a:t>
             </a:fld>
             <a:endParaRPr lang="en-IE"/>
           </a:p>
@@ -2080,7 +2086,7 @@
           <a:p>
             <a:fld id="{B16F96D5-A50A-49F2-A6B4-50C10BB05220}" type="datetimeFigureOut">
               <a:rPr lang="en-IE" smtClean="0"/>
-              <a:t>09/02/2022</a:t>
+              <a:t>01/04/2022</a:t>
             </a:fld>
             <a:endParaRPr lang="en-IE"/>
           </a:p>
@@ -2393,7 +2399,7 @@
           <a:p>
             <a:fld id="{B16F96D5-A50A-49F2-A6B4-50C10BB05220}" type="datetimeFigureOut">
               <a:rPr lang="en-IE" smtClean="0"/>
-              <a:t>09/02/2022</a:t>
+              <a:t>01/04/2022</a:t>
             </a:fld>
             <a:endParaRPr lang="en-IE"/>
           </a:p>
@@ -2682,7 +2688,7 @@
           <a:p>
             <a:fld id="{B16F96D5-A50A-49F2-A6B4-50C10BB05220}" type="datetimeFigureOut">
               <a:rPr lang="en-IE" smtClean="0"/>
-              <a:t>09/02/2022</a:t>
+              <a:t>01/04/2022</a:t>
             </a:fld>
             <a:endParaRPr lang="en-IE"/>
           </a:p>
@@ -2925,7 +2931,7 @@
           <a:p>
             <a:fld id="{B16F96D5-A50A-49F2-A6B4-50C10BB05220}" type="datetimeFigureOut">
               <a:rPr lang="en-IE" smtClean="0"/>
-              <a:t>09/02/2022</a:t>
+              <a:t>01/04/2022</a:t>
             </a:fld>
             <a:endParaRPr lang="en-IE"/>
           </a:p>
@@ -3328,6 +3334,14 @@
 <file path=ppt/slides/slide1.xml><?xml version="1.0" encoding="utf-8"?>
 <p:sld xmlns:a="http://schemas.openxmlformats.org/drawingml/2006/main" xmlns:r="http://schemas.openxmlformats.org/officeDocument/2006/relationships" xmlns:p="http://schemas.openxmlformats.org/presentationml/2006/main">
   <p:cSld>
+    <p:bg>
+      <p:bgPr>
+        <a:solidFill>
+          <a:srgbClr val="F1EDE2"/>
+        </a:solidFill>
+        <a:effectLst/>
+      </p:bgPr>
+    </p:bg>
     <p:spTree>
       <p:nvGrpSpPr>
         <p:cNvPr id="1" name=""/>
@@ -4051,6 +4065,16 @@
         </p:nvPicPr>
         <p:blipFill>
           <a:blip r:embed="rId2">
+            <a:clrChange>
+              <a:clrFrom>
+                <a:srgbClr val="FFFFFF"/>
+              </a:clrFrom>
+              <a:clrTo>
+                <a:srgbClr val="FFFFFF">
+                  <a:alpha val="0"/>
+                </a:srgbClr>
+              </a:clrTo>
+            </a:clrChange>
             <a:extLst>
               <a:ext uri="{28A0092B-C50C-407E-A947-70E740481C1C}">
                 <a14:useLocalDpi xmlns:a14="http://schemas.microsoft.com/office/drawing/2010/main" val="0"/>
@@ -4968,6 +4992,101 @@
     <p:extLst>
       <p:ext uri="{BB962C8B-B14F-4D97-AF65-F5344CB8AC3E}">
         <p14:creationId xmlns:p14="http://schemas.microsoft.com/office/powerpoint/2010/main" val="608377350"/>
+      </p:ext>
+    </p:extLst>
+  </p:cSld>
+  <p:clrMapOvr>
+    <a:masterClrMapping/>
+  </p:clrMapOvr>
+</p:sld>
+</file>
+
+<file path=ppt/slides/slide2.xml><?xml version="1.0" encoding="utf-8"?>
+<p:sld xmlns:a="http://schemas.openxmlformats.org/drawingml/2006/main" xmlns:r="http://schemas.openxmlformats.org/officeDocument/2006/relationships" xmlns:p="http://schemas.openxmlformats.org/presentationml/2006/main">
+  <p:cSld>
+    <p:bg>
+      <p:bgPr>
+        <a:solidFill>
+          <a:srgbClr val="F1EDE2"/>
+        </a:solidFill>
+        <a:effectLst/>
+      </p:bgPr>
+    </p:bg>
+    <p:spTree>
+      <p:nvGrpSpPr>
+        <p:cNvPr id="1" name=""/>
+        <p:cNvGrpSpPr/>
+        <p:nvPr/>
+      </p:nvGrpSpPr>
+      <p:grpSpPr>
+        <a:xfrm>
+          <a:off x="0" y="0"/>
+          <a:ext cx="0" cy="0"/>
+          <a:chOff x="0" y="0"/>
+          <a:chExt cx="0" cy="0"/>
+        </a:xfrm>
+      </p:grpSpPr>
+      <p:pic>
+        <p:nvPicPr>
+          <p:cNvPr id="1026" name="Picture 2" descr="News - Waterford Institute of Technology and Prof. Sasitharan  Balasubramaniam join FutureNeuro">
+            <a:extLst>
+              <a:ext uri="{FF2B5EF4-FFF2-40B4-BE49-F238E27FC236}">
+                <a16:creationId xmlns:a16="http://schemas.microsoft.com/office/drawing/2014/main" id="{0DBD214C-FF8C-40A6-896E-0E208A3C1A17}"/>
+              </a:ext>
+            </a:extLst>
+          </p:cNvPr>
+          <p:cNvPicPr>
+            <a:picLocks noChangeAspect="1" noChangeArrowheads="1"/>
+          </p:cNvPicPr>
+          <p:nvPr/>
+        </p:nvPicPr>
+        <p:blipFill>
+          <a:blip r:embed="rId2">
+            <a:clrChange>
+              <a:clrFrom>
+                <a:srgbClr val="FFFFFF"/>
+              </a:clrFrom>
+              <a:clrTo>
+                <a:srgbClr val="FFFFFF">
+                  <a:alpha val="0"/>
+                </a:srgbClr>
+              </a:clrTo>
+            </a:clrChange>
+            <a:extLst>
+              <a:ext uri="{28A0092B-C50C-407E-A947-70E740481C1C}">
+                <a14:useLocalDpi xmlns:a14="http://schemas.microsoft.com/office/drawing/2010/main" val="0"/>
+              </a:ext>
+            </a:extLst>
+          </a:blip>
+          <a:srcRect/>
+          <a:stretch>
+            <a:fillRect/>
+          </a:stretch>
+        </p:blipFill>
+        <p:spPr bwMode="auto">
+          <a:xfrm>
+            <a:off x="3262313" y="1781175"/>
+            <a:ext cx="5667375" cy="3295650"/>
+          </a:xfrm>
+          <a:prstGeom prst="rect">
+            <a:avLst/>
+          </a:prstGeom>
+          <a:noFill/>
+          <a:extLst>
+            <a:ext uri="{909E8E84-426E-40DD-AFC4-6F175D3DCCD1}">
+              <a14:hiddenFill xmlns:a14="http://schemas.microsoft.com/office/drawing/2010/main">
+                <a:solidFill>
+                  <a:srgbClr val="FFFFFF"/>
+                </a:solidFill>
+              </a14:hiddenFill>
+            </a:ext>
+          </a:extLst>
+        </p:spPr>
+      </p:pic>
+    </p:spTree>
+    <p:extLst>
+      <p:ext uri="{BB962C8B-B14F-4D97-AF65-F5344CB8AC3E}">
+        <p14:creationId xmlns:p14="http://schemas.microsoft.com/office/powerpoint/2010/main" val="834102211"/>
       </p:ext>
     </p:extLst>
   </p:cSld>

</xml_diff>